<commit_message>
fixed typos in module8, module 11 & 12. Added some notes but still needs more notes
</commit_message>
<xml_diff>
--- a/Slides/Module 08 Patterns of React.pptx
+++ b/Slides/Module 08 Patterns of React.pptx
@@ -333,6 +333,11 @@
       </a:defRPr>
     </a:lvl9pPr>
   </p:defaultTextStyle>
+  <p:extLst>
+    <p:ext uri="{EFAFB233-063F-42B5-8137-9DF3F51BA10A}">
+      <p15:sldGuideLst xmlns:p15="http://schemas.microsoft.com/office/powerpoint/2012/main"/>
+    </p:ext>
+  </p:extLst>
 </p:presentation>
 </file>
 
@@ -4794,11 +4799,32 @@
           <a:lstStyle/>
           <a:p>
             <a:r>
+              <a:rPr dirty="0"/>
               <a:t>CS 4530: Fundamentals of Software Engineering</a:t>
             </a:r>
-            <a:br/>
-            <a:r>
-              <a:t>Lesson 8 Patterns of React</a:t>
+            <a:br>
+              <a:rPr dirty="0"/>
+            </a:br>
+            <a:br>
+              <a:rPr lang="en-US" dirty="0"/>
+            </a:br>
+            <a:r>
+              <a:rPr lang="en-US"/>
+              <a:t>Module</a:t>
+            </a:r>
+            <a:r>
+              <a:t> 8</a:t>
+            </a:r>
+            <a:r>
+              <a:rPr lang="en-US"/>
+              <a:t>:</a:t>
+            </a:r>
+            <a:r>
+              <a:t> </a:t>
+            </a:r>
+            <a:r>
+              <a:rPr dirty="0"/>
+              <a:t>Patterns of React</a:t>
             </a:r>
           </a:p>
         </p:txBody>
@@ -4815,7 +4841,7 @@
         </p:nvSpPr>
         <p:spPr>
           <a:xfrm>
-            <a:off x="539260" y="2593592"/>
+            <a:off x="539259" y="3429000"/>
             <a:ext cx="10128740" cy="1655762"/>
           </a:xfrm>
           <a:prstGeom prst="rect">
@@ -4827,11 +4853,13 @@
           <a:lstStyle/>
           <a:p>
             <a:r>
+              <a:rPr dirty="0"/>
               <a:t>Jonathan Bell, Adeel Bhutta, Mitch Wand</a:t>
             </a:r>
           </a:p>
           <a:p>
             <a:r>
+              <a:rPr dirty="0"/>
               <a:t>Khoury College of Computer Sciences</a:t>
             </a:r>
           </a:p>
@@ -4866,6 +4894,7 @@
           <a:lstStyle/>
           <a:p>
             <a:fld id="{86CB4B4D-7CA3-9044-876B-883B54F8677D}" type="slidenum">
+              <a:rPr/>
               <a:t>1</a:t>
             </a:fld>
             <a:endParaRPr/>

</xml_diff>